<commit_message>
Extend CornerRoundedness getter to handle Round2SameRectangle shape type
</commit_message>
<xml_diff>
--- a/test/ShapeCrawler.Tests.Unit/Assets/057_corner-radius.pptx
+++ b/test/ShapeCrawler.Tests.Unit/Assets/057_corner-radius.pptx
@@ -8,6 +8,7 @@
     <p:sldId id="256" r:id="rId2"/>
     <p:sldId id="257" r:id="rId3"/>
     <p:sldId id="258" r:id="rId4"/>
+    <p:sldId id="259" r:id="rId5"/>
   </p:sldIdLst>
   <p:sldSz cx="12192000" cy="6858000"/>
   <p:notesSz cx="6858000" cy="9144000"/>
@@ -124,12 +125,17 @@
             <a:srgbClr val="A4A3A4"/>
           </p15:clr>
         </p15:guide>
-        <p15:guide id="4" pos="1128" userDrawn="1">
+        <p15:guide id="4" orient="horz" pos="1008" userDrawn="1">
           <p15:clr>
             <a:srgbClr val="A4A3A4"/>
           </p15:clr>
         </p15:guide>
-        <p15:guide id="5" pos="1824" userDrawn="1">
+        <p15:guide id="5" pos="6720" userDrawn="1">
+          <p15:clr>
+            <a:srgbClr val="A4A3A4"/>
+          </p15:clr>
+        </p15:guide>
+        <p15:guide id="6" pos="7224" userDrawn="1">
           <p15:clr>
             <a:srgbClr val="A4A3A4"/>
           </p15:clr>
@@ -287,7 +293,7 @@
           <a:p>
             <a:fld id="{1E2F5295-5D25-4560-B9D5-D96F51D1A085}" type="datetimeFigureOut">
               <a:rPr lang="en-US" smtClean="0"/>
-              <a:t>6/7/2024</a:t>
+              <a:t>12/11/2024</a:t>
             </a:fld>
             <a:endParaRPr lang="en-US"/>
           </a:p>
@@ -485,7 +491,7 @@
           <a:p>
             <a:fld id="{1E2F5295-5D25-4560-B9D5-D96F51D1A085}" type="datetimeFigureOut">
               <a:rPr lang="en-US" smtClean="0"/>
-              <a:t>6/7/2024</a:t>
+              <a:t>12/11/2024</a:t>
             </a:fld>
             <a:endParaRPr lang="en-US"/>
           </a:p>
@@ -693,7 +699,7 @@
           <a:p>
             <a:fld id="{1E2F5295-5D25-4560-B9D5-D96F51D1A085}" type="datetimeFigureOut">
               <a:rPr lang="en-US" smtClean="0"/>
-              <a:t>6/7/2024</a:t>
+              <a:t>12/11/2024</a:t>
             </a:fld>
             <a:endParaRPr lang="en-US"/>
           </a:p>
@@ -891,7 +897,7 @@
           <a:p>
             <a:fld id="{1E2F5295-5D25-4560-B9D5-D96F51D1A085}" type="datetimeFigureOut">
               <a:rPr lang="en-US" smtClean="0"/>
-              <a:t>6/7/2024</a:t>
+              <a:t>12/11/2024</a:t>
             </a:fld>
             <a:endParaRPr lang="en-US"/>
           </a:p>
@@ -1166,7 +1172,7 @@
           <a:p>
             <a:fld id="{1E2F5295-5D25-4560-B9D5-D96F51D1A085}" type="datetimeFigureOut">
               <a:rPr lang="en-US" smtClean="0"/>
-              <a:t>6/7/2024</a:t>
+              <a:t>12/11/2024</a:t>
             </a:fld>
             <a:endParaRPr lang="en-US"/>
           </a:p>
@@ -1431,7 +1437,7 @@
           <a:p>
             <a:fld id="{1E2F5295-5D25-4560-B9D5-D96F51D1A085}" type="datetimeFigureOut">
               <a:rPr lang="en-US" smtClean="0"/>
-              <a:t>6/7/2024</a:t>
+              <a:t>12/11/2024</a:t>
             </a:fld>
             <a:endParaRPr lang="en-US"/>
           </a:p>
@@ -1843,7 +1849,7 @@
           <a:p>
             <a:fld id="{1E2F5295-5D25-4560-B9D5-D96F51D1A085}" type="datetimeFigureOut">
               <a:rPr lang="en-US" smtClean="0"/>
-              <a:t>6/7/2024</a:t>
+              <a:t>12/11/2024</a:t>
             </a:fld>
             <a:endParaRPr lang="en-US"/>
           </a:p>
@@ -1984,7 +1990,7 @@
           <a:p>
             <a:fld id="{1E2F5295-5D25-4560-B9D5-D96F51D1A085}" type="datetimeFigureOut">
               <a:rPr lang="en-US" smtClean="0"/>
-              <a:t>6/7/2024</a:t>
+              <a:t>12/11/2024</a:t>
             </a:fld>
             <a:endParaRPr lang="en-US"/>
           </a:p>
@@ -2097,7 +2103,7 @@
           <a:p>
             <a:fld id="{1E2F5295-5D25-4560-B9D5-D96F51D1A085}" type="datetimeFigureOut">
               <a:rPr lang="en-US" smtClean="0"/>
-              <a:t>6/7/2024</a:t>
+              <a:t>12/11/2024</a:t>
             </a:fld>
             <a:endParaRPr lang="en-US"/>
           </a:p>
@@ -2408,7 +2414,7 @@
           <a:p>
             <a:fld id="{1E2F5295-5D25-4560-B9D5-D96F51D1A085}" type="datetimeFigureOut">
               <a:rPr lang="en-US" smtClean="0"/>
-              <a:t>6/7/2024</a:t>
+              <a:t>12/11/2024</a:t>
             </a:fld>
             <a:endParaRPr lang="en-US"/>
           </a:p>
@@ -2696,7 +2702,7 @@
           <a:p>
             <a:fld id="{1E2F5295-5D25-4560-B9D5-D96F51D1A085}" type="datetimeFigureOut">
               <a:rPr lang="en-US" smtClean="0"/>
-              <a:t>6/7/2024</a:t>
+              <a:t>12/11/2024</a:t>
             </a:fld>
             <a:endParaRPr lang="en-US"/>
           </a:p>
@@ -2937,7 +2943,7 @@
           <a:p>
             <a:fld id="{1E2F5295-5D25-4560-B9D5-D96F51D1A085}" type="datetimeFigureOut">
               <a:rPr lang="en-US" smtClean="0"/>
-              <a:t>6/7/2024</a:t>
+              <a:t>12/11/2024</a:t>
             </a:fld>
             <a:endParaRPr lang="en-US"/>
           </a:p>
@@ -4481,6 +4487,241 @@
     <p:extLst>
       <p:ext uri="{BB962C8B-B14F-4D97-AF65-F5344CB8AC3E}">
         <p14:creationId xmlns:p14="http://schemas.microsoft.com/office/powerpoint/2010/main" val="3216765818"/>
+      </p:ext>
+    </p:extLst>
+  </p:cSld>
+  <p:clrMapOvr>
+    <a:masterClrMapping/>
+  </p:clrMapOvr>
+</p:sld>
+</file>
+
+<file path=ppt/slides/slide4.xml><?xml version="1.0" encoding="utf-8"?>
+<p:sld xmlns:a="http://schemas.openxmlformats.org/drawingml/2006/main" xmlns:r="http://schemas.openxmlformats.org/officeDocument/2006/relationships" xmlns:p="http://schemas.openxmlformats.org/presentationml/2006/main">
+  <p:cSld>
+    <p:spTree>
+      <p:nvGrpSpPr>
+        <p:cNvPr id="1" name=""/>
+        <p:cNvGrpSpPr/>
+        <p:nvPr/>
+      </p:nvGrpSpPr>
+      <p:grpSpPr>
+        <a:xfrm>
+          <a:off x="0" y="0"/>
+          <a:ext cx="0" cy="0"/>
+          <a:chOff x="0" y="0"/>
+          <a:chExt cx="0" cy="0"/>
+        </a:xfrm>
+      </p:grpSpPr>
+      <p:sp>
+        <p:nvSpPr>
+          <p:cNvPr id="2" name="Top Rounded X">
+            <a:extLst>
+              <a:ext uri="{FF2B5EF4-FFF2-40B4-BE49-F238E27FC236}">
+                <a16:creationId xmlns:a16="http://schemas.microsoft.com/office/drawing/2014/main" id="{810BB08C-729C-CE9B-9115-79492BBC4770}"/>
+              </a:ext>
+            </a:extLst>
+          </p:cNvPr>
+          <p:cNvSpPr/>
+          <p:nvPr/>
+        </p:nvSpPr>
+        <p:spPr>
+          <a:xfrm>
+            <a:off x="609602" y="685800"/>
+            <a:ext cx="3011497" cy="1067713"/>
+          </a:xfrm>
+          <a:prstGeom prst="round2SameRect">
+            <a:avLst/>
+          </a:prstGeom>
+        </p:spPr>
+        <p:style>
+          <a:lnRef idx="2">
+            <a:schemeClr val="accent1">
+              <a:shade val="15000"/>
+            </a:schemeClr>
+          </a:lnRef>
+          <a:fillRef idx="1">
+            <a:schemeClr val="accent1"/>
+          </a:fillRef>
+          <a:effectRef idx="0">
+            <a:schemeClr val="accent1"/>
+          </a:effectRef>
+          <a:fontRef idx="minor">
+            <a:schemeClr val="lt1"/>
+          </a:fontRef>
+        </p:style>
+        <p:txBody>
+          <a:bodyPr rtlCol="0" anchor="ctr"/>
+          <a:lstStyle/>
+          <a:p>
+            <a:pPr algn="ctr"/>
+            <a:r>
+              <a:rPr lang="en-US" dirty="0"/>
+              <a:t>X</a:t>
+            </a:r>
+          </a:p>
+        </p:txBody>
+      </p:sp>
+      <p:sp>
+        <p:nvSpPr>
+          <p:cNvPr id="3" name="Top Rounded 1">
+            <a:extLst>
+              <a:ext uri="{FF2B5EF4-FFF2-40B4-BE49-F238E27FC236}">
+                <a16:creationId xmlns:a16="http://schemas.microsoft.com/office/drawing/2014/main" id="{294FAFC4-2F09-5774-F903-DFC9062EABAE}"/>
+              </a:ext>
+            </a:extLst>
+          </p:cNvPr>
+          <p:cNvSpPr/>
+          <p:nvPr/>
+        </p:nvSpPr>
+        <p:spPr>
+          <a:xfrm>
+            <a:off x="609601" y="2196112"/>
+            <a:ext cx="3011497" cy="1067713"/>
+          </a:xfrm>
+          <a:prstGeom prst="round2SameRect">
+            <a:avLst>
+              <a:gd name="adj1" fmla="val 50000"/>
+              <a:gd name="adj2" fmla="val 0"/>
+            </a:avLst>
+          </a:prstGeom>
+        </p:spPr>
+        <p:style>
+          <a:lnRef idx="2">
+            <a:schemeClr val="accent1">
+              <a:shade val="15000"/>
+            </a:schemeClr>
+          </a:lnRef>
+          <a:fillRef idx="1">
+            <a:schemeClr val="accent1"/>
+          </a:fillRef>
+          <a:effectRef idx="0">
+            <a:schemeClr val="accent1"/>
+          </a:effectRef>
+          <a:fontRef idx="minor">
+            <a:schemeClr val="lt1"/>
+          </a:fontRef>
+        </p:style>
+        <p:txBody>
+          <a:bodyPr rtlCol="0" anchor="ctr"/>
+          <a:lstStyle/>
+          <a:p>
+            <a:pPr algn="ctr"/>
+            <a:r>
+              <a:rPr lang="en-US" dirty="0"/>
+              <a:t>1</a:t>
+            </a:r>
+          </a:p>
+        </p:txBody>
+      </p:sp>
+      <p:sp>
+        <p:nvSpPr>
+          <p:cNvPr id="4" name="Top Rounded 0">
+            <a:extLst>
+              <a:ext uri="{FF2B5EF4-FFF2-40B4-BE49-F238E27FC236}">
+                <a16:creationId xmlns:a16="http://schemas.microsoft.com/office/drawing/2014/main" id="{B5786CEA-30F6-4039-41C0-47A53BCFD68F}"/>
+              </a:ext>
+            </a:extLst>
+          </p:cNvPr>
+          <p:cNvSpPr/>
+          <p:nvPr/>
+        </p:nvSpPr>
+        <p:spPr>
+          <a:xfrm>
+            <a:off x="609600" y="3706424"/>
+            <a:ext cx="3011497" cy="1067713"/>
+          </a:xfrm>
+          <a:prstGeom prst="round2SameRect">
+            <a:avLst>
+              <a:gd name="adj1" fmla="val 0"/>
+              <a:gd name="adj2" fmla="val 0"/>
+            </a:avLst>
+          </a:prstGeom>
+        </p:spPr>
+        <p:style>
+          <a:lnRef idx="2">
+            <a:schemeClr val="accent1">
+              <a:shade val="15000"/>
+            </a:schemeClr>
+          </a:lnRef>
+          <a:fillRef idx="1">
+            <a:schemeClr val="accent1"/>
+          </a:fillRef>
+          <a:effectRef idx="0">
+            <a:schemeClr val="accent1"/>
+          </a:effectRef>
+          <a:fontRef idx="minor">
+            <a:schemeClr val="lt1"/>
+          </a:fontRef>
+        </p:style>
+        <p:txBody>
+          <a:bodyPr rtlCol="0" anchor="ctr"/>
+          <a:lstStyle/>
+          <a:p>
+            <a:pPr algn="ctr"/>
+            <a:r>
+              <a:rPr lang="en-US" dirty="0"/>
+              <a:t>0</a:t>
+            </a:r>
+          </a:p>
+        </p:txBody>
+      </p:sp>
+      <p:sp>
+        <p:nvSpPr>
+          <p:cNvPr id="5" name="Top Rounded 0.125-ish">
+            <a:extLst>
+              <a:ext uri="{FF2B5EF4-FFF2-40B4-BE49-F238E27FC236}">
+                <a16:creationId xmlns:a16="http://schemas.microsoft.com/office/drawing/2014/main" id="{5CC368F0-0748-9DA2-74F7-65625C6048E2}"/>
+              </a:ext>
+            </a:extLst>
+          </p:cNvPr>
+          <p:cNvSpPr/>
+          <p:nvPr/>
+        </p:nvSpPr>
+        <p:spPr>
+          <a:xfrm>
+            <a:off x="8839200" y="685800"/>
+            <a:ext cx="2743200" cy="1828800"/>
+          </a:xfrm>
+          <a:prstGeom prst="round2SameRect">
+            <a:avLst>
+              <a:gd name="adj1" fmla="val 6145"/>
+              <a:gd name="adj2" fmla="val 0"/>
+            </a:avLst>
+          </a:prstGeom>
+        </p:spPr>
+        <p:style>
+          <a:lnRef idx="2">
+            <a:schemeClr val="accent1">
+              <a:shade val="15000"/>
+            </a:schemeClr>
+          </a:lnRef>
+          <a:fillRef idx="1">
+            <a:schemeClr val="accent1"/>
+          </a:fillRef>
+          <a:effectRef idx="0">
+            <a:schemeClr val="accent1"/>
+          </a:effectRef>
+          <a:fontRef idx="minor">
+            <a:schemeClr val="lt1"/>
+          </a:fontRef>
+        </p:style>
+        <p:txBody>
+          <a:bodyPr rtlCol="0" anchor="ctr"/>
+          <a:lstStyle/>
+          <a:p>
+            <a:pPr algn="ctr"/>
+            <a:r>
+              <a:rPr lang="en-US" dirty="0"/>
+              <a:t>0.125</a:t>
+            </a:r>
+          </a:p>
+        </p:txBody>
+      </p:sp>
+    </p:spTree>
+    <p:extLst>
+      <p:ext uri="{BB962C8B-B14F-4D97-AF65-F5344CB8AC3E}">
+        <p14:creationId xmlns:p14="http://schemas.microsoft.com/office/powerpoint/2010/main" val="3194014451"/>
       </p:ext>
     </p:extLst>
   </p:cSld>

</xml_diff>